<commit_message>
Simplify slides a bit and add more samples.
</commit_message>
<xml_diff>
--- a/lectures/debugging.pptx
+++ b/lectures/debugging.pptx
@@ -134,7 +134,7 @@
   </p:defaultTextStyle>
   <p:extLst>
     <p:ext uri="{EFAFB233-063F-42B5-8137-9DF3F51BA10A}">
-      <p15:sldGuideLst xmlns:p15="http://schemas.microsoft.com/office/powerpoint/2012/main">
+      <p15:sldGuideLst xmlns:p15="http://schemas.microsoft.com/office/powerpoint/2012/main" xmlns="">
         <p15:guide id="1" orient="horz" pos="2160">
           <p15:clr>
             <a:srgbClr val="A4A3A4"/>
@@ -233,7 +233,7 @@
           <a:p>
             <a:fld id="{E9C7438F-E6B2-0141-B34C-29FE4CEF604C}" type="datetimeFigureOut">
               <a:rPr lang="en-US" smtClean="0"/>
-              <a:t>7/24/17</a:t>
+              <a:t>7/27/17</a:t>
             </a:fld>
             <a:endParaRPr lang="en-US"/>
           </a:p>
@@ -632,7 +632,7 @@
           <a:p>
             <a:fld id="{569DD0F9-79D7-7041-9FCD-6B61FEBE4817}" type="datetimeFigureOut">
               <a:rPr lang="en-US" smtClean="0"/>
-              <a:t>7/24/17</a:t>
+              <a:t>7/27/17</a:t>
             </a:fld>
             <a:endParaRPr lang="en-US"/>
           </a:p>
@@ -797,7 +797,7 @@
           <a:p>
             <a:fld id="{569DD0F9-79D7-7041-9FCD-6B61FEBE4817}" type="datetimeFigureOut">
               <a:rPr lang="en-US" smtClean="0"/>
-              <a:t>7/24/17</a:t>
+              <a:t>7/27/17</a:t>
             </a:fld>
             <a:endParaRPr lang="en-US"/>
           </a:p>
@@ -972,7 +972,7 @@
           <a:p>
             <a:fld id="{569DD0F9-79D7-7041-9FCD-6B61FEBE4817}" type="datetimeFigureOut">
               <a:rPr lang="en-US" smtClean="0"/>
-              <a:t>7/24/17</a:t>
+              <a:t>7/27/17</a:t>
             </a:fld>
             <a:endParaRPr lang="en-US"/>
           </a:p>
@@ -1137,7 +1137,7 @@
           <a:p>
             <a:fld id="{569DD0F9-79D7-7041-9FCD-6B61FEBE4817}" type="datetimeFigureOut">
               <a:rPr lang="en-US" smtClean="0"/>
-              <a:t>7/24/17</a:t>
+              <a:t>7/27/17</a:t>
             </a:fld>
             <a:endParaRPr lang="en-US"/>
           </a:p>
@@ -1376,7 +1376,7 @@
           <a:p>
             <a:fld id="{569DD0F9-79D7-7041-9FCD-6B61FEBE4817}" type="datetimeFigureOut">
               <a:rPr lang="en-US" smtClean="0"/>
-              <a:t>7/24/17</a:t>
+              <a:t>7/27/17</a:t>
             </a:fld>
             <a:endParaRPr lang="en-US"/>
           </a:p>
@@ -1603,7 +1603,7 @@
           <a:p>
             <a:fld id="{569DD0F9-79D7-7041-9FCD-6B61FEBE4817}" type="datetimeFigureOut">
               <a:rPr lang="en-US" smtClean="0"/>
-              <a:t>7/24/17</a:t>
+              <a:t>7/27/17</a:t>
             </a:fld>
             <a:endParaRPr lang="en-US"/>
           </a:p>
@@ -1965,7 +1965,7 @@
           <a:p>
             <a:fld id="{569DD0F9-79D7-7041-9FCD-6B61FEBE4817}" type="datetimeFigureOut">
               <a:rPr lang="en-US" smtClean="0"/>
-              <a:t>7/24/17</a:t>
+              <a:t>7/27/17</a:t>
             </a:fld>
             <a:endParaRPr lang="en-US"/>
           </a:p>
@@ -2078,7 +2078,7 @@
           <a:p>
             <a:fld id="{569DD0F9-79D7-7041-9FCD-6B61FEBE4817}" type="datetimeFigureOut">
               <a:rPr lang="en-US" smtClean="0"/>
-              <a:t>7/24/17</a:t>
+              <a:t>7/27/17</a:t>
             </a:fld>
             <a:endParaRPr lang="en-US"/>
           </a:p>
@@ -2168,7 +2168,7 @@
           <a:p>
             <a:fld id="{569DD0F9-79D7-7041-9FCD-6B61FEBE4817}" type="datetimeFigureOut">
               <a:rPr lang="en-US" smtClean="0"/>
-              <a:t>7/24/17</a:t>
+              <a:t>7/27/17</a:t>
             </a:fld>
             <a:endParaRPr lang="en-US"/>
           </a:p>
@@ -2440,7 +2440,7 @@
           <a:p>
             <a:fld id="{569DD0F9-79D7-7041-9FCD-6B61FEBE4817}" type="datetimeFigureOut">
               <a:rPr lang="en-US" smtClean="0"/>
-              <a:t>7/24/17</a:t>
+              <a:t>7/27/17</a:t>
             </a:fld>
             <a:endParaRPr lang="en-US"/>
           </a:p>
@@ -2692,7 +2692,7 @@
           <a:p>
             <a:fld id="{569DD0F9-79D7-7041-9FCD-6B61FEBE4817}" type="datetimeFigureOut">
               <a:rPr lang="en-US" smtClean="0"/>
-              <a:t>7/24/17</a:t>
+              <a:t>7/27/17</a:t>
             </a:fld>
             <a:endParaRPr lang="en-US"/>
           </a:p>
@@ -2900,7 +2900,7 @@
           <a:p>
             <a:fld id="{569DD0F9-79D7-7041-9FCD-6B61FEBE4817}" type="datetimeFigureOut">
               <a:rPr lang="en-US" smtClean="0"/>
-              <a:t>7/24/17</a:t>
+              <a:t>7/27/17</a:t>
             </a:fld>
             <a:endParaRPr lang="en-US"/>
           </a:p>
@@ -4319,7 +4319,11 @@
           <a:p>
             <a:r>
               <a:rPr lang="en-US" dirty="0" smtClean="0"/>
-              <a:t>Gray area examples</a:t>
+              <a:t>Gray area </a:t>
+            </a:r>
+            <a:r>
+              <a:rPr lang="en-US" dirty="0" smtClean="0"/>
+              <a:t>examples (make sample5.x)</a:t>
             </a:r>
             <a:endParaRPr lang="en-US" dirty="0"/>
           </a:p>
@@ -4522,7 +4526,19 @@
           <a:p>
             <a:r>
               <a:rPr lang="en-US" dirty="0" smtClean="0"/>
-              <a:t>Gray area examples</a:t>
+              <a:t>Gray area </a:t>
+            </a:r>
+            <a:r>
+              <a:rPr lang="en-US" dirty="0"/>
+              <a:t>examples (make </a:t>
+            </a:r>
+            <a:r>
+              <a:rPr lang="en-US" dirty="0" smtClean="0"/>
+              <a:t>sample6.x</a:t>
+            </a:r>
+            <a:r>
+              <a:rPr lang="en-US" dirty="0"/>
+              <a:t>)</a:t>
             </a:r>
             <a:endParaRPr lang="en-US" dirty="0"/>
           </a:p>
@@ -5048,7 +5064,11 @@
             </a:r>
             <a:r>
               <a:rPr lang="en-US" dirty="0" smtClean="0"/>
-              <a:t> I</a:t>
+              <a:t> </a:t>
+            </a:r>
+            <a:r>
+              <a:rPr lang="en-US" dirty="0" smtClean="0"/>
+              <a:t>I (make sample7.x)</a:t>
             </a:r>
             <a:endParaRPr lang="en-US" dirty="0"/>
           </a:p>
@@ -5158,8 +5178,8 @@
               <a:t> </a:t>
             </a:r>
             <a:r>
-              <a:rPr lang="en-US" sz="1800" b="1" dirty="0" err="1" smtClean="0"/>
-              <a:t>my_prog</a:t>
+              <a:rPr lang="en-US" sz="1800" b="1" dirty="0" smtClean="0"/>
+              <a:t>./sample7.x</a:t>
             </a:r>
             <a:endParaRPr lang="en-US" sz="1800" b="1" dirty="0" smtClean="0"/>
           </a:p>
@@ -5812,7 +5832,11 @@
             </a:r>
             <a:r>
               <a:rPr lang="en-US" dirty="0" smtClean="0"/>
-              <a:t> III</a:t>
+              <a:t> </a:t>
+            </a:r>
+            <a:r>
+              <a:rPr lang="en-US" dirty="0" smtClean="0"/>
+              <a:t>III (make sample8.x)</a:t>
             </a:r>
             <a:endParaRPr lang="en-US" dirty="0"/>
           </a:p>
@@ -6054,8 +6078,8 @@
         </p:nvSpPr>
         <p:spPr>
           <a:xfrm>
-            <a:off x="739422" y="4548804"/>
-            <a:ext cx="1540934" cy="322352"/>
+            <a:off x="739422" y="4591136"/>
+            <a:ext cx="1540934" cy="208230"/>
           </a:xfrm>
           <a:prstGeom prst="rect">
             <a:avLst/>
@@ -6100,8 +6124,146 @@
         </p:nvSpPr>
         <p:spPr>
           <a:xfrm>
-            <a:off x="739422" y="5877187"/>
-            <a:ext cx="1952978" cy="322352"/>
+            <a:off x="739422" y="5919519"/>
+            <a:ext cx="1952978" cy="208230"/>
+          </a:xfrm>
+          <a:prstGeom prst="rect">
+            <a:avLst/>
+          </a:prstGeom>
+          <a:noFill/>
+          <a:ln>
+            <a:solidFill>
+              <a:schemeClr val="tx1"/>
+            </a:solidFill>
+          </a:ln>
+        </p:spPr>
+        <p:style>
+          <a:lnRef idx="2">
+            <a:schemeClr val="accent1">
+              <a:shade val="50000"/>
+            </a:schemeClr>
+          </a:lnRef>
+          <a:fillRef idx="1">
+            <a:schemeClr val="accent1"/>
+          </a:fillRef>
+          <a:effectRef idx="0">
+            <a:schemeClr val="accent1"/>
+          </a:effectRef>
+          <a:fontRef idx="minor">
+            <a:schemeClr val="lt1"/>
+          </a:fontRef>
+        </p:style>
+        <p:txBody>
+          <a:bodyPr rtlCol="0" anchor="ctr"/>
+          <a:lstStyle/>
+          <a:p>
+            <a:pPr algn="ctr"/>
+            <a:endParaRPr lang="en-US"/>
+          </a:p>
+        </p:txBody>
+      </p:sp>
+      <p:sp>
+        <p:nvSpPr>
+          <p:cNvPr id="9" name="Rectangle 8"/>
+          <p:cNvSpPr/>
+          <p:nvPr/>
+        </p:nvSpPr>
+        <p:spPr>
+          <a:xfrm>
+            <a:off x="739422" y="3301997"/>
+            <a:ext cx="911578" cy="208230"/>
+          </a:xfrm>
+          <a:prstGeom prst="rect">
+            <a:avLst/>
+          </a:prstGeom>
+          <a:noFill/>
+          <a:ln>
+            <a:solidFill>
+              <a:schemeClr val="tx1"/>
+            </a:solidFill>
+          </a:ln>
+        </p:spPr>
+        <p:style>
+          <a:lnRef idx="2">
+            <a:schemeClr val="accent1">
+              <a:shade val="50000"/>
+            </a:schemeClr>
+          </a:lnRef>
+          <a:fillRef idx="1">
+            <a:schemeClr val="accent1"/>
+          </a:fillRef>
+          <a:effectRef idx="0">
+            <a:schemeClr val="accent1"/>
+          </a:effectRef>
+          <a:fontRef idx="minor">
+            <a:schemeClr val="lt1"/>
+          </a:fontRef>
+        </p:style>
+        <p:txBody>
+          <a:bodyPr rtlCol="0" anchor="ctr"/>
+          <a:lstStyle/>
+          <a:p>
+            <a:pPr algn="ctr"/>
+            <a:endParaRPr lang="en-US"/>
+          </a:p>
+        </p:txBody>
+      </p:sp>
+      <p:sp>
+        <p:nvSpPr>
+          <p:cNvPr id="10" name="Rectangle 9"/>
+          <p:cNvSpPr/>
+          <p:nvPr/>
+        </p:nvSpPr>
+        <p:spPr>
+          <a:xfrm>
+            <a:off x="739422" y="5484369"/>
+            <a:ext cx="1540934" cy="208230"/>
+          </a:xfrm>
+          <a:prstGeom prst="rect">
+            <a:avLst/>
+          </a:prstGeom>
+          <a:noFill/>
+          <a:ln>
+            <a:solidFill>
+              <a:schemeClr val="tx1"/>
+            </a:solidFill>
+          </a:ln>
+        </p:spPr>
+        <p:style>
+          <a:lnRef idx="2">
+            <a:schemeClr val="accent1">
+              <a:shade val="50000"/>
+            </a:schemeClr>
+          </a:lnRef>
+          <a:fillRef idx="1">
+            <a:schemeClr val="accent1"/>
+          </a:fillRef>
+          <a:effectRef idx="0">
+            <a:schemeClr val="accent1"/>
+          </a:effectRef>
+          <a:fontRef idx="minor">
+            <a:schemeClr val="lt1"/>
+          </a:fontRef>
+        </p:style>
+        <p:txBody>
+          <a:bodyPr rtlCol="0" anchor="ctr"/>
+          <a:lstStyle/>
+          <a:p>
+            <a:pPr algn="ctr"/>
+            <a:endParaRPr lang="en-US"/>
+          </a:p>
+        </p:txBody>
+      </p:sp>
+      <p:sp>
+        <p:nvSpPr>
+          <p:cNvPr id="11" name="Rectangle 10"/>
+          <p:cNvSpPr/>
+          <p:nvPr/>
+        </p:nvSpPr>
+        <p:spPr>
+          <a:xfrm>
+            <a:off x="739422" y="5044722"/>
+            <a:ext cx="1800578" cy="208230"/>
           </a:xfrm>
           <a:prstGeom prst="rect">
             <a:avLst/>
@@ -6193,7 +6355,11 @@
             </a:r>
             <a:r>
               <a:rPr lang="en-US" dirty="0" smtClean="0"/>
-              <a:t> IV</a:t>
+              <a:t> </a:t>
+            </a:r>
+            <a:r>
+              <a:rPr lang="en-US" dirty="0" smtClean="0"/>
+              <a:t>IV (make sample9.x)</a:t>
             </a:r>
             <a:endParaRPr lang="en-US" dirty="0"/>
           </a:p>
@@ -6389,6 +6555,98 @@
           </a:p>
         </p:txBody>
       </p:sp>
+      <p:sp>
+        <p:nvSpPr>
+          <p:cNvPr id="12" name="Rectangle 11"/>
+          <p:cNvSpPr/>
+          <p:nvPr/>
+        </p:nvSpPr>
+        <p:spPr>
+          <a:xfrm>
+            <a:off x="628649" y="3404307"/>
+            <a:ext cx="722490" cy="186266"/>
+          </a:xfrm>
+          <a:prstGeom prst="rect">
+            <a:avLst/>
+          </a:prstGeom>
+          <a:noFill/>
+          <a:ln>
+            <a:solidFill>
+              <a:schemeClr val="tx1"/>
+            </a:solidFill>
+          </a:ln>
+        </p:spPr>
+        <p:style>
+          <a:lnRef idx="2">
+            <a:schemeClr val="accent1">
+              <a:shade val="50000"/>
+            </a:schemeClr>
+          </a:lnRef>
+          <a:fillRef idx="1">
+            <a:schemeClr val="accent1"/>
+          </a:fillRef>
+          <a:effectRef idx="0">
+            <a:schemeClr val="accent1"/>
+          </a:effectRef>
+          <a:fontRef idx="minor">
+            <a:schemeClr val="lt1"/>
+          </a:fontRef>
+        </p:style>
+        <p:txBody>
+          <a:bodyPr rtlCol="0" anchor="ctr"/>
+          <a:lstStyle/>
+          <a:p>
+            <a:pPr algn="ctr"/>
+            <a:endParaRPr lang="en-US"/>
+          </a:p>
+        </p:txBody>
+      </p:sp>
+      <p:sp>
+        <p:nvSpPr>
+          <p:cNvPr id="13" name="Rectangle 12"/>
+          <p:cNvSpPr/>
+          <p:nvPr/>
+        </p:nvSpPr>
+        <p:spPr>
+          <a:xfrm>
+            <a:off x="628650" y="2546352"/>
+            <a:ext cx="620183" cy="186266"/>
+          </a:xfrm>
+          <a:prstGeom prst="rect">
+            <a:avLst/>
+          </a:prstGeom>
+          <a:noFill/>
+          <a:ln>
+            <a:solidFill>
+              <a:schemeClr val="tx1"/>
+            </a:solidFill>
+          </a:ln>
+        </p:spPr>
+        <p:style>
+          <a:lnRef idx="2">
+            <a:schemeClr val="accent1">
+              <a:shade val="50000"/>
+            </a:schemeClr>
+          </a:lnRef>
+          <a:fillRef idx="1">
+            <a:schemeClr val="accent1"/>
+          </a:fillRef>
+          <a:effectRef idx="0">
+            <a:schemeClr val="accent1"/>
+          </a:effectRef>
+          <a:fontRef idx="minor">
+            <a:schemeClr val="lt1"/>
+          </a:fontRef>
+        </p:style>
+        <p:txBody>
+          <a:bodyPr rtlCol="0" anchor="ctr"/>
+          <a:lstStyle/>
+          <a:p>
+            <a:pPr algn="ctr"/>
+            <a:endParaRPr lang="en-US"/>
+          </a:p>
+        </p:txBody>
+      </p:sp>
     </p:spTree>
     <p:extLst>
       <p:ext uri="{BB962C8B-B14F-4D97-AF65-F5344CB8AC3E}">
@@ -6444,7 +6702,11 @@
             </a:r>
             <a:r>
               <a:rPr lang="en-US" dirty="0" smtClean="0"/>
-              <a:t> V</a:t>
+              <a:t> </a:t>
+            </a:r>
+            <a:r>
+              <a:rPr lang="en-US" dirty="0" smtClean="0"/>
+              <a:t>V (make sample10.x)</a:t>
             </a:r>
             <a:endParaRPr lang="en-US" dirty="0"/>
           </a:p>
@@ -6691,293 +6953,6 @@
           </a:p>
         </p:txBody>
       </p:sp>
-      <p:sp>
-        <p:nvSpPr>
-          <p:cNvPr id="6" name="TextBox 5"/>
-          <p:cNvSpPr txBox="1"/>
-          <p:nvPr/>
-        </p:nvSpPr>
-        <p:spPr>
-          <a:xfrm>
-            <a:off x="575393" y="2563898"/>
-            <a:ext cx="3996607" cy="1200329"/>
-          </a:xfrm>
-          <a:prstGeom prst="rect">
-            <a:avLst/>
-          </a:prstGeom>
-          <a:noFill/>
-        </p:spPr>
-        <p:txBody>
-          <a:bodyPr wrap="none" rtlCol="0">
-            <a:spAutoFit/>
-          </a:bodyPr>
-          <a:lstStyle/>
-          <a:p>
-            <a:r>
-              <a:rPr lang="en-US" sz="1200" dirty="0" smtClean="0">
-                <a:latin typeface="Courier New" charset="0"/>
-                <a:ea typeface="Courier New" charset="0"/>
-                <a:cs typeface="Courier New" charset="0"/>
-              </a:rPr>
-              <a:t>double&amp; matrix::</a:t>
-            </a:r>
-            <a:r>
-              <a:rPr lang="en-US" sz="1200" dirty="0" err="1" smtClean="0">
-                <a:latin typeface="Courier New" charset="0"/>
-                <a:ea typeface="Courier New" charset="0"/>
-                <a:cs typeface="Courier New" charset="0"/>
-              </a:rPr>
-              <a:t>get_element</a:t>
-            </a:r>
-            <a:r>
-              <a:rPr lang="en-US" sz="1200" dirty="0" smtClean="0">
-                <a:latin typeface="Courier New" charset="0"/>
-                <a:ea typeface="Courier New" charset="0"/>
-                <a:cs typeface="Courier New" charset="0"/>
-              </a:rPr>
-              <a:t>(</a:t>
-            </a:r>
-            <a:r>
-              <a:rPr lang="en-US" sz="1200" dirty="0" err="1" smtClean="0">
-                <a:latin typeface="Courier New" charset="0"/>
-                <a:ea typeface="Courier New" charset="0"/>
-                <a:cs typeface="Courier New" charset="0"/>
-              </a:rPr>
-              <a:t>int</a:t>
-            </a:r>
-            <a:r>
-              <a:rPr lang="en-US" sz="1200" dirty="0" smtClean="0">
-                <a:latin typeface="Courier New" charset="0"/>
-                <a:ea typeface="Courier New" charset="0"/>
-                <a:cs typeface="Courier New" charset="0"/>
-              </a:rPr>
-              <a:t> </a:t>
-            </a:r>
-            <a:r>
-              <a:rPr lang="en-US" sz="1200" dirty="0" err="1" smtClean="0">
-                <a:latin typeface="Courier New" charset="0"/>
-                <a:ea typeface="Courier New" charset="0"/>
-                <a:cs typeface="Courier New" charset="0"/>
-              </a:rPr>
-              <a:t>i</a:t>
-            </a:r>
-            <a:r>
-              <a:rPr lang="en-US" sz="1200" dirty="0" smtClean="0">
-                <a:latin typeface="Courier New" charset="0"/>
-                <a:ea typeface="Courier New" charset="0"/>
-                <a:cs typeface="Courier New" charset="0"/>
-              </a:rPr>
-              <a:t>, </a:t>
-            </a:r>
-            <a:r>
-              <a:rPr lang="en-US" sz="1200" dirty="0" err="1" smtClean="0">
-                <a:latin typeface="Courier New" charset="0"/>
-                <a:ea typeface="Courier New" charset="0"/>
-                <a:cs typeface="Courier New" charset="0"/>
-              </a:rPr>
-              <a:t>int</a:t>
-            </a:r>
-            <a:r>
-              <a:rPr lang="en-US" sz="1200" dirty="0" smtClean="0">
-                <a:latin typeface="Courier New" charset="0"/>
-                <a:ea typeface="Courier New" charset="0"/>
-                <a:cs typeface="Courier New" charset="0"/>
-              </a:rPr>
-              <a:t> j)</a:t>
-            </a:r>
-          </a:p>
-          <a:p>
-            <a:r>
-              <a:rPr lang="en-US" sz="1200" dirty="0" smtClean="0">
-                <a:latin typeface="Courier New" charset="0"/>
-                <a:ea typeface="Courier New" charset="0"/>
-                <a:cs typeface="Courier New" charset="0"/>
-              </a:rPr>
-              <a:t>{</a:t>
-            </a:r>
-            <a:endParaRPr lang="en-US" sz="1200" dirty="0">
-              <a:latin typeface="Courier New" charset="0"/>
-              <a:ea typeface="Courier New" charset="0"/>
-              <a:cs typeface="Courier New" charset="0"/>
-            </a:endParaRPr>
-          </a:p>
-          <a:p>
-            <a:r>
-              <a:rPr lang="en-US" sz="1200" dirty="0">
-                <a:latin typeface="Courier New" charset="0"/>
-                <a:ea typeface="Courier New" charset="0"/>
-                <a:cs typeface="Courier New" charset="0"/>
-              </a:rPr>
-              <a:t>	assert(</a:t>
-            </a:r>
-            <a:r>
-              <a:rPr lang="en-US" sz="1200" dirty="0" err="1">
-                <a:latin typeface="Courier New" charset="0"/>
-                <a:ea typeface="Courier New" charset="0"/>
-                <a:cs typeface="Courier New" charset="0"/>
-              </a:rPr>
-              <a:t>i</a:t>
-            </a:r>
-            <a:r>
-              <a:rPr lang="en-US" sz="1200" dirty="0">
-                <a:latin typeface="Courier New" charset="0"/>
-                <a:ea typeface="Courier New" charset="0"/>
-                <a:cs typeface="Courier New" charset="0"/>
-              </a:rPr>
-              <a:t> &gt; 0 &amp;&amp; </a:t>
-            </a:r>
-            <a:r>
-              <a:rPr lang="en-US" sz="1200" dirty="0" err="1">
-                <a:latin typeface="Courier New" charset="0"/>
-                <a:ea typeface="Courier New" charset="0"/>
-                <a:cs typeface="Courier New" charset="0"/>
-              </a:rPr>
-              <a:t>i</a:t>
-            </a:r>
-            <a:r>
-              <a:rPr lang="en-US" sz="1200" dirty="0">
-                <a:latin typeface="Courier New" charset="0"/>
-                <a:ea typeface="Courier New" charset="0"/>
-                <a:cs typeface="Courier New" charset="0"/>
-              </a:rPr>
-              <a:t> &lt; this-&gt;m</a:t>
-            </a:r>
-            <a:r>
-              <a:rPr lang="en-US" sz="1200" dirty="0" smtClean="0">
-                <a:latin typeface="Courier New" charset="0"/>
-                <a:ea typeface="Courier New" charset="0"/>
-                <a:cs typeface="Courier New" charset="0"/>
-              </a:rPr>
-              <a:t>);</a:t>
-            </a:r>
-            <a:endParaRPr lang="en-US" sz="1200" dirty="0">
-              <a:latin typeface="Courier New" charset="0"/>
-              <a:ea typeface="Courier New" charset="0"/>
-              <a:cs typeface="Courier New" charset="0"/>
-            </a:endParaRPr>
-          </a:p>
-          <a:p>
-            <a:r>
-              <a:rPr lang="en-US" sz="1200" dirty="0">
-                <a:latin typeface="Courier New" charset="0"/>
-                <a:ea typeface="Courier New" charset="0"/>
-                <a:cs typeface="Courier New" charset="0"/>
-              </a:rPr>
-              <a:t>	</a:t>
-            </a:r>
-            <a:r>
-              <a:rPr lang="en-US" sz="1200" dirty="0" smtClean="0">
-                <a:latin typeface="Courier New" charset="0"/>
-                <a:ea typeface="Courier New" charset="0"/>
-                <a:cs typeface="Courier New" charset="0"/>
-              </a:rPr>
-              <a:t>assert(j </a:t>
-            </a:r>
-            <a:r>
-              <a:rPr lang="en-US" sz="1200" dirty="0">
-                <a:latin typeface="Courier New" charset="0"/>
-                <a:ea typeface="Courier New" charset="0"/>
-                <a:cs typeface="Courier New" charset="0"/>
-              </a:rPr>
-              <a:t>&gt; 0 &amp;&amp; </a:t>
-            </a:r>
-            <a:r>
-              <a:rPr lang="en-US" sz="1200" dirty="0" smtClean="0">
-                <a:latin typeface="Courier New" charset="0"/>
-                <a:ea typeface="Courier New" charset="0"/>
-                <a:cs typeface="Courier New" charset="0"/>
-              </a:rPr>
-              <a:t>j </a:t>
-            </a:r>
-            <a:r>
-              <a:rPr lang="en-US" sz="1200" dirty="0">
-                <a:latin typeface="Courier New" charset="0"/>
-                <a:ea typeface="Courier New" charset="0"/>
-                <a:cs typeface="Courier New" charset="0"/>
-              </a:rPr>
-              <a:t>&lt; this-</a:t>
-            </a:r>
-            <a:r>
-              <a:rPr lang="en-US" sz="1200" dirty="0" smtClean="0">
-                <a:latin typeface="Courier New" charset="0"/>
-                <a:ea typeface="Courier New" charset="0"/>
-                <a:cs typeface="Courier New" charset="0"/>
-              </a:rPr>
-              <a:t>&gt;n);</a:t>
-            </a:r>
-          </a:p>
-          <a:p>
-            <a:r>
-              <a:rPr lang="en-US" sz="1200" dirty="0">
-                <a:latin typeface="Courier New" charset="0"/>
-                <a:ea typeface="Courier New" charset="0"/>
-                <a:cs typeface="Courier New" charset="0"/>
-              </a:rPr>
-              <a:t>	</a:t>
-            </a:r>
-            <a:r>
-              <a:rPr lang="en-US" sz="1200" dirty="0" smtClean="0">
-                <a:latin typeface="Courier New" charset="0"/>
-                <a:ea typeface="Courier New" charset="0"/>
-                <a:cs typeface="Courier New" charset="0"/>
-              </a:rPr>
-              <a:t>return data[</a:t>
-            </a:r>
-            <a:r>
-              <a:rPr lang="en-US" sz="1200" dirty="0" err="1" smtClean="0">
-                <a:latin typeface="Courier New" charset="0"/>
-                <a:ea typeface="Courier New" charset="0"/>
-                <a:cs typeface="Courier New" charset="0"/>
-              </a:rPr>
-              <a:t>i</a:t>
-            </a:r>
-            <a:r>
-              <a:rPr lang="en-US" sz="1200" dirty="0" smtClean="0">
-                <a:latin typeface="Courier New" charset="0"/>
-                <a:ea typeface="Courier New" charset="0"/>
-                <a:cs typeface="Courier New" charset="0"/>
-              </a:rPr>
-              <a:t> + j*this-&gt;</a:t>
-            </a:r>
-            <a:r>
-              <a:rPr lang="en-US" sz="1200" dirty="0" err="1" smtClean="0">
-                <a:latin typeface="Courier New" charset="0"/>
-                <a:ea typeface="Courier New" charset="0"/>
-                <a:cs typeface="Courier New" charset="0"/>
-              </a:rPr>
-              <a:t>lda</a:t>
-            </a:r>
-            <a:r>
-              <a:rPr lang="en-US" sz="1200" dirty="0" smtClean="0">
-                <a:latin typeface="Courier New" charset="0"/>
-                <a:ea typeface="Courier New" charset="0"/>
-                <a:cs typeface="Courier New" charset="0"/>
-              </a:rPr>
-              <a:t>];</a:t>
-            </a:r>
-            <a:endParaRPr lang="en-US" sz="1200" dirty="0">
-              <a:latin typeface="Courier New" charset="0"/>
-              <a:ea typeface="Courier New" charset="0"/>
-              <a:cs typeface="Courier New" charset="0"/>
-            </a:endParaRPr>
-          </a:p>
-          <a:p>
-            <a:r>
-              <a:rPr lang="en-US" sz="1200" dirty="0" smtClean="0">
-                <a:latin typeface="Courier New" charset="0"/>
-                <a:ea typeface="Courier New" charset="0"/>
-                <a:cs typeface="Courier New" charset="0"/>
-              </a:rPr>
-              <a:t>}</a:t>
-            </a:r>
-            <a:endParaRPr lang="en-US" sz="1200" dirty="0">
-              <a:latin typeface="Courier New" charset="0"/>
-              <a:ea typeface="Courier New" charset="0"/>
-              <a:cs typeface="Courier New" charset="0"/>
-            </a:endParaRPr>
-          </a:p>
-        </p:txBody>
-      </p:sp>
       <p:pic>
         <p:nvPicPr>
           <p:cNvPr id="7" name="Picture 6"/>
@@ -7016,7 +6991,7 @@
         </p:nvSpPr>
         <p:spPr>
           <a:xfrm>
-            <a:off x="4955822" y="2881649"/>
+            <a:off x="2638072" y="2733483"/>
             <a:ext cx="3759200" cy="923330"/>
           </a:xfrm>
           <a:prstGeom prst="rect">
@@ -7037,15 +7012,7 @@
           <a:p>
             <a:r>
               <a:rPr lang="en-US" dirty="0" smtClean="0"/>
-              <a:t>Assertions can be disabled with the compiler flag –DNDEBUG, </a:t>
-            </a:r>
-            <a:r>
-              <a:rPr lang="en-US" smtClean="0"/>
-              <a:t>so  they </a:t>
-            </a:r>
-            <a:r>
-              <a:rPr lang="en-US" dirty="0" smtClean="0"/>
-              <a:t>won’t slow down production code.</a:t>
+              <a:t>Assertions can be disabled with the compiler flag –DNDEBUG, so  they won’t slow down production code.</a:t>
             </a:r>
             <a:endParaRPr lang="en-US" dirty="0"/>
           </a:p>
@@ -7856,14 +7823,20 @@
         </p:nvSpPr>
         <p:spPr/>
         <p:txBody>
-          <a:bodyPr/>
-          <a:lstStyle/>
-          <a:p>
-            <a:r>
-              <a:rPr lang="en-US" dirty="0" smtClean="0"/>
-              <a:t>Syntax error examples</a:t>
-            </a:r>
-            <a:endParaRPr lang="en-US" dirty="0"/>
+          <a:bodyPr>
+            <a:normAutofit/>
+          </a:bodyPr>
+          <a:lstStyle/>
+          <a:p>
+            <a:r>
+              <a:rPr lang="en-US" sz="3200" dirty="0" smtClean="0"/>
+              <a:t>Syntax error </a:t>
+            </a:r>
+            <a:r>
+              <a:rPr lang="en-US" sz="3200" dirty="0" smtClean="0"/>
+              <a:t>examples (make sample[1-3].x)</a:t>
+            </a:r>
+            <a:endParaRPr lang="en-US" sz="3200" dirty="0"/>
           </a:p>
         </p:txBody>
       </p:sp>
@@ -8311,7 +8284,11 @@
             </a:r>
             <a:r>
               <a:rPr lang="is-IS" dirty="0" smtClean="0"/>
-              <a:t>…”</a:t>
+              <a:t>…</a:t>
+            </a:r>
+            <a:r>
+              <a:rPr lang="is-IS" dirty="0" smtClean="0"/>
+              <a:t>” (make sample4.x)</a:t>
             </a:r>
             <a:endParaRPr lang="en-US" dirty="0"/>
           </a:p>
@@ -9091,7 +9068,7 @@
   <a:extraClrSchemeLst/>
   <a:extLst>
     <a:ext uri="{05A4C25C-085E-4340-85A3-A5531E510DB2}">
-      <thm15:themeFamily xmlns:thm15="http://schemas.microsoft.com/office/thememl/2012/main" name="Office Theme" id="{62F939B6-93AF-4DB8-9C6B-D6C7DFDC589F}" vid="{4A3C46E8-61CC-4603-A589-7422A47A8E4A}"/>
+      <thm15:themeFamily xmlns:thm15="http://schemas.microsoft.com/office/thememl/2012/main" xmlns="" name="Office Theme" id="{62F939B6-93AF-4DB8-9C6B-D6C7DFDC589F}" vid="{4A3C46E8-61CC-4603-A589-7422A47A8E4A}"/>
     </a:ext>
   </a:extLst>
 </a:theme>
@@ -9352,7 +9329,7 @@
   <a:extraClrSchemeLst/>
   <a:extLst>
     <a:ext uri="{05A4C25C-085E-4340-85A3-A5531E510DB2}">
-      <thm15:themeFamily xmlns:thm15="http://schemas.microsoft.com/office/thememl/2012/main" name="Office Theme" id="{62F939B6-93AF-4DB8-9C6B-D6C7DFDC589F}" vid="{4A3C46E8-61CC-4603-A589-7422A47A8E4A}"/>
+      <thm15:themeFamily xmlns:thm15="http://schemas.microsoft.com/office/thememl/2012/main" xmlns="" name="Office Theme" id="{62F939B6-93AF-4DB8-9C6B-D6C7DFDC589F}" vid="{4A3C46E8-61CC-4603-A589-7422A47A8E4A}"/>
     </a:ext>
   </a:extLst>
 </a:theme>

</xml_diff>